<commit_message>
Add TestSheet Change Source.c
</commit_message>
<xml_diff>
--- a/Blackjack_Specification.pptx
+++ b/Blackjack_Specification.pptx
@@ -342,7 +342,7 @@
           <a:p>
             <a:fld id="{4E20A766-C8EB-451D-9BE2-7CA46CD79056}" type="datetimeFigureOut">
               <a:rPr kumimoji="1" lang="ja-JP" altLang="en-US" smtClean="0"/>
-              <a:t>2019/3/17</a:t>
+              <a:t>2019/3/29</a:t>
             </a:fld>
             <a:endParaRPr kumimoji="1" lang="ja-JP" altLang="en-US"/>
           </a:p>
@@ -564,7 +564,7 @@
           <a:p>
             <a:fld id="{4E20A766-C8EB-451D-9BE2-7CA46CD79056}" type="datetimeFigureOut">
               <a:rPr kumimoji="1" lang="ja-JP" altLang="en-US" smtClean="0"/>
-              <a:t>2019/3/17</a:t>
+              <a:t>2019/3/29</a:t>
             </a:fld>
             <a:endParaRPr kumimoji="1" lang="ja-JP" altLang="en-US"/>
           </a:p>
@@ -776,7 +776,7 @@
           <a:p>
             <a:fld id="{4E20A766-C8EB-451D-9BE2-7CA46CD79056}" type="datetimeFigureOut">
               <a:rPr kumimoji="1" lang="ja-JP" altLang="en-US" smtClean="0"/>
-              <a:t>2019/3/17</a:t>
+              <a:t>2019/3/29</a:t>
             </a:fld>
             <a:endParaRPr kumimoji="1" lang="ja-JP" altLang="en-US"/>
           </a:p>
@@ -978,7 +978,7 @@
           <a:p>
             <a:fld id="{4E20A766-C8EB-451D-9BE2-7CA46CD79056}" type="datetimeFigureOut">
               <a:rPr kumimoji="1" lang="ja-JP" altLang="en-US" smtClean="0"/>
-              <a:t>2019/3/17</a:t>
+              <a:t>2019/3/29</a:t>
             </a:fld>
             <a:endParaRPr kumimoji="1" lang="ja-JP" altLang="en-US"/>
           </a:p>
@@ -1234,7 +1234,7 @@
           <a:p>
             <a:fld id="{4E20A766-C8EB-451D-9BE2-7CA46CD79056}" type="datetimeFigureOut">
               <a:rPr kumimoji="1" lang="ja-JP" altLang="en-US" smtClean="0"/>
-              <a:t>2019/3/17</a:t>
+              <a:t>2019/3/29</a:t>
             </a:fld>
             <a:endParaRPr kumimoji="1" lang="ja-JP" altLang="en-US"/>
           </a:p>
@@ -1586,7 +1586,7 @@
           <a:p>
             <a:fld id="{4E20A766-C8EB-451D-9BE2-7CA46CD79056}" type="datetimeFigureOut">
               <a:rPr kumimoji="1" lang="ja-JP" altLang="en-US" smtClean="0"/>
-              <a:t>2019/3/17</a:t>
+              <a:t>2019/3/29</a:t>
             </a:fld>
             <a:endParaRPr kumimoji="1" lang="ja-JP" altLang="en-US"/>
           </a:p>
@@ -2088,7 +2088,7 @@
           <a:p>
             <a:fld id="{4E20A766-C8EB-451D-9BE2-7CA46CD79056}" type="datetimeFigureOut">
               <a:rPr kumimoji="1" lang="ja-JP" altLang="en-US" smtClean="0"/>
-              <a:t>2019/3/17</a:t>
+              <a:t>2019/3/29</a:t>
             </a:fld>
             <a:endParaRPr kumimoji="1" lang="ja-JP" altLang="en-US"/>
           </a:p>
@@ -2206,7 +2206,7 @@
           <a:p>
             <a:fld id="{4E20A766-C8EB-451D-9BE2-7CA46CD79056}" type="datetimeFigureOut">
               <a:rPr kumimoji="1" lang="ja-JP" altLang="en-US" smtClean="0"/>
-              <a:t>2019/3/17</a:t>
+              <a:t>2019/3/29</a:t>
             </a:fld>
             <a:endParaRPr kumimoji="1" lang="ja-JP" altLang="en-US"/>
           </a:p>
@@ -2301,7 +2301,7 @@
           <a:p>
             <a:fld id="{4E20A766-C8EB-451D-9BE2-7CA46CD79056}" type="datetimeFigureOut">
               <a:rPr kumimoji="1" lang="ja-JP" altLang="en-US" smtClean="0"/>
-              <a:t>2019/3/17</a:t>
+              <a:t>2019/3/29</a:t>
             </a:fld>
             <a:endParaRPr kumimoji="1" lang="ja-JP" altLang="en-US"/>
           </a:p>
@@ -2689,7 +2689,7 @@
           <a:p>
             <a:fld id="{4E20A766-C8EB-451D-9BE2-7CA46CD79056}" type="datetimeFigureOut">
               <a:rPr kumimoji="1" lang="ja-JP" altLang="en-US" smtClean="0"/>
-              <a:t>2019/3/17</a:t>
+              <a:t>2019/3/29</a:t>
             </a:fld>
             <a:endParaRPr kumimoji="1" lang="ja-JP" altLang="en-US"/>
           </a:p>
@@ -3005,7 +3005,7 @@
           <a:p>
             <a:fld id="{4E20A766-C8EB-451D-9BE2-7CA46CD79056}" type="datetimeFigureOut">
               <a:rPr kumimoji="1" lang="ja-JP" altLang="en-US" smtClean="0"/>
-              <a:t>2019/3/17</a:t>
+              <a:t>2019/3/29</a:t>
             </a:fld>
             <a:endParaRPr kumimoji="1" lang="ja-JP" altLang="en-US"/>
           </a:p>
@@ -3270,7 +3270,7 @@
           <a:p>
             <a:fld id="{4E20A766-C8EB-451D-9BE2-7CA46CD79056}" type="datetimeFigureOut">
               <a:rPr kumimoji="1" lang="ja-JP" altLang="en-US" smtClean="0"/>
-              <a:t>2019/3/17</a:t>
+              <a:t>2019/3/29</a:t>
             </a:fld>
             <a:endParaRPr kumimoji="1" lang="ja-JP" altLang="en-US"/>
           </a:p>
@@ -3763,13 +3763,8 @@
                 </a:solidFill>
                 <a:ea typeface="DejaVu Sans"/>
               </a:rPr>
-              <a:t>Required specifications</a:t>
-            </a:r>
-            <a:endParaRPr kumimoji="1" lang="ja-JP" altLang="en-US" dirty="0">
-              <a:solidFill>
-                <a:srgbClr val="FF0000"/>
-              </a:solidFill>
-            </a:endParaRPr>
+              <a:t>specifications</a:t>
+            </a:r>
           </a:p>
         </p:txBody>
       </p:sp>

</xml_diff>